<commit_message>
Update Ecosave iteration1 presentation.pptx
</commit_message>
<xml_diff>
--- a/Ecosave iteration1 presentation.pptx
+++ b/Ecosave iteration1 presentation.pptx
@@ -4,6 +4,9 @@
   <p:sldMasterIdLst>
     <p:sldMasterId id="2147483648" r:id="rId1"/>
   </p:sldMasterIdLst>
+  <p:notesMasterIdLst>
+    <p:notesMasterId r:id="rId8"/>
+  </p:notesMasterIdLst>
   <p:sldIdLst>
     <p:sldId id="256" r:id="rId2"/>
     <p:sldId id="257" r:id="rId3"/>
@@ -109,7 +112,458 @@
       </a:defRPr>
     </a:lvl9pPr>
   </p:defaultTextStyle>
+  <p:extLst>
+    <p:ext uri="{EFAFB233-063F-42B5-8137-9DF3F51BA10A}">
+      <p15:sldGuideLst xmlns:p15="http://schemas.microsoft.com/office/powerpoint/2012/main"/>
+    </p:ext>
+  </p:extLst>
 </p:presentation>
+</file>
+
+<file path=ppt/notesMasters/notesMaster1.xml><?xml version="1.0" encoding="utf-8"?>
+<p:notesMaster xmlns:a="http://schemas.openxmlformats.org/drawingml/2006/main" xmlns:r="http://schemas.openxmlformats.org/officeDocument/2006/relationships" xmlns:p="http://schemas.openxmlformats.org/presentationml/2006/main">
+  <p:cSld>
+    <p:bg>
+      <p:bgRef idx="1001">
+        <a:schemeClr val="bg1"/>
+      </p:bgRef>
+    </p:bg>
+    <p:spTree>
+      <p:nvGrpSpPr>
+        <p:cNvPr id="1" name=""/>
+        <p:cNvGrpSpPr/>
+        <p:nvPr/>
+      </p:nvGrpSpPr>
+      <p:grpSpPr>
+        <a:xfrm>
+          <a:off x="0" y="0"/>
+          <a:ext cx="0" cy="0"/>
+          <a:chOff x="0" y="0"/>
+          <a:chExt cx="0" cy="0"/>
+        </a:xfrm>
+      </p:grpSpPr>
+      <p:sp>
+        <p:nvSpPr>
+          <p:cNvPr id="2" name="Header Placeholder 1"/>
+          <p:cNvSpPr>
+            <a:spLocks noGrp="1"/>
+          </p:cNvSpPr>
+          <p:nvPr>
+            <p:ph type="hdr" sz="quarter"/>
+          </p:nvPr>
+        </p:nvSpPr>
+        <p:spPr>
+          <a:xfrm>
+            <a:off x="0" y="0"/>
+            <a:ext cx="2971800" cy="458788"/>
+          </a:xfrm>
+          <a:prstGeom prst="rect">
+            <a:avLst/>
+          </a:prstGeom>
+        </p:spPr>
+        <p:txBody>
+          <a:bodyPr vert="horz" lIns="91440" tIns="45720" rIns="91440" bIns="45720" rtlCol="0"/>
+          <a:lstStyle>
+            <a:lvl1pPr algn="l">
+              <a:defRPr sz="1200"/>
+            </a:lvl1pPr>
+          </a:lstStyle>
+          <a:p>
+            <a:endParaRPr lang="en-US"/>
+          </a:p>
+        </p:txBody>
+      </p:sp>
+      <p:sp>
+        <p:nvSpPr>
+          <p:cNvPr id="3" name="Date Placeholder 2"/>
+          <p:cNvSpPr>
+            <a:spLocks noGrp="1"/>
+          </p:cNvSpPr>
+          <p:nvPr>
+            <p:ph type="dt" idx="1"/>
+          </p:nvPr>
+        </p:nvSpPr>
+        <p:spPr>
+          <a:xfrm>
+            <a:off x="3884613" y="0"/>
+            <a:ext cx="2971800" cy="458788"/>
+          </a:xfrm>
+          <a:prstGeom prst="rect">
+            <a:avLst/>
+          </a:prstGeom>
+        </p:spPr>
+        <p:txBody>
+          <a:bodyPr vert="horz" lIns="91440" tIns="45720" rIns="91440" bIns="45720" rtlCol="0"/>
+          <a:lstStyle>
+            <a:lvl1pPr algn="r">
+              <a:defRPr sz="1200"/>
+            </a:lvl1pPr>
+          </a:lstStyle>
+          <a:p>
+            <a:fld id="{B2F010EE-D477-4F89-B6FD-645214761CBD}" type="datetimeFigureOut">
+              <a:rPr lang="en-US" smtClean="0"/>
+              <a:t>3/10/2020</a:t>
+            </a:fld>
+            <a:endParaRPr lang="en-US"/>
+          </a:p>
+        </p:txBody>
+      </p:sp>
+      <p:sp>
+        <p:nvSpPr>
+          <p:cNvPr id="4" name="Slide Image Placeholder 3"/>
+          <p:cNvSpPr>
+            <a:spLocks noGrp="1" noRot="1" noChangeAspect="1"/>
+          </p:cNvSpPr>
+          <p:nvPr>
+            <p:ph type="sldImg" idx="2"/>
+          </p:nvPr>
+        </p:nvSpPr>
+        <p:spPr>
+          <a:xfrm>
+            <a:off x="685800" y="1143000"/>
+            <a:ext cx="5486400" cy="3086100"/>
+          </a:xfrm>
+          <a:prstGeom prst="rect">
+            <a:avLst/>
+          </a:prstGeom>
+          <a:noFill/>
+          <a:ln w="12700">
+            <a:solidFill>
+              <a:prstClr val="black"/>
+            </a:solidFill>
+          </a:ln>
+        </p:spPr>
+        <p:txBody>
+          <a:bodyPr vert="horz" lIns="91440" tIns="45720" rIns="91440" bIns="45720" rtlCol="0" anchor="ctr"/>
+          <a:lstStyle/>
+          <a:p>
+            <a:endParaRPr lang="en-US"/>
+          </a:p>
+        </p:txBody>
+      </p:sp>
+      <p:sp>
+        <p:nvSpPr>
+          <p:cNvPr id="5" name="Notes Placeholder 4"/>
+          <p:cNvSpPr>
+            <a:spLocks noGrp="1"/>
+          </p:cNvSpPr>
+          <p:nvPr>
+            <p:ph type="body" sz="quarter" idx="3"/>
+          </p:nvPr>
+        </p:nvSpPr>
+        <p:spPr>
+          <a:xfrm>
+            <a:off x="685800" y="4400550"/>
+            <a:ext cx="5486400" cy="3600450"/>
+          </a:xfrm>
+          <a:prstGeom prst="rect">
+            <a:avLst/>
+          </a:prstGeom>
+        </p:spPr>
+        <p:txBody>
+          <a:bodyPr vert="horz" lIns="91440" tIns="45720" rIns="91440" bIns="45720" rtlCol="0"/>
+          <a:lstStyle/>
+          <a:p>
+            <a:pPr lvl="0"/>
+            <a:r>
+              <a:rPr lang="en-US" smtClean="0"/>
+              <a:t>Edit Master text styles</a:t>
+            </a:r>
+          </a:p>
+          <a:p>
+            <a:pPr lvl="1"/>
+            <a:r>
+              <a:rPr lang="en-US" smtClean="0"/>
+              <a:t>Second level</a:t>
+            </a:r>
+          </a:p>
+          <a:p>
+            <a:pPr lvl="2"/>
+            <a:r>
+              <a:rPr lang="en-US" smtClean="0"/>
+              <a:t>Third level</a:t>
+            </a:r>
+          </a:p>
+          <a:p>
+            <a:pPr lvl="3"/>
+            <a:r>
+              <a:rPr lang="en-US" smtClean="0"/>
+              <a:t>Fourth level</a:t>
+            </a:r>
+          </a:p>
+          <a:p>
+            <a:pPr lvl="4"/>
+            <a:r>
+              <a:rPr lang="en-US" smtClean="0"/>
+              <a:t>Fifth level</a:t>
+            </a:r>
+            <a:endParaRPr lang="en-US"/>
+          </a:p>
+        </p:txBody>
+      </p:sp>
+      <p:sp>
+        <p:nvSpPr>
+          <p:cNvPr id="6" name="Footer Placeholder 5"/>
+          <p:cNvSpPr>
+            <a:spLocks noGrp="1"/>
+          </p:cNvSpPr>
+          <p:nvPr>
+            <p:ph type="ftr" sz="quarter" idx="4"/>
+          </p:nvPr>
+        </p:nvSpPr>
+        <p:spPr>
+          <a:xfrm>
+            <a:off x="0" y="8685213"/>
+            <a:ext cx="2971800" cy="458787"/>
+          </a:xfrm>
+          <a:prstGeom prst="rect">
+            <a:avLst/>
+          </a:prstGeom>
+        </p:spPr>
+        <p:txBody>
+          <a:bodyPr vert="horz" lIns="91440" tIns="45720" rIns="91440" bIns="45720" rtlCol="0" anchor="b"/>
+          <a:lstStyle>
+            <a:lvl1pPr algn="l">
+              <a:defRPr sz="1200"/>
+            </a:lvl1pPr>
+          </a:lstStyle>
+          <a:p>
+            <a:endParaRPr lang="en-US"/>
+          </a:p>
+        </p:txBody>
+      </p:sp>
+      <p:sp>
+        <p:nvSpPr>
+          <p:cNvPr id="7" name="Slide Number Placeholder 6"/>
+          <p:cNvSpPr>
+            <a:spLocks noGrp="1"/>
+          </p:cNvSpPr>
+          <p:nvPr>
+            <p:ph type="sldNum" sz="quarter" idx="5"/>
+          </p:nvPr>
+        </p:nvSpPr>
+        <p:spPr>
+          <a:xfrm>
+            <a:off x="3884613" y="8685213"/>
+            <a:ext cx="2971800" cy="458787"/>
+          </a:xfrm>
+          <a:prstGeom prst="rect">
+            <a:avLst/>
+          </a:prstGeom>
+        </p:spPr>
+        <p:txBody>
+          <a:bodyPr vert="horz" lIns="91440" tIns="45720" rIns="91440" bIns="45720" rtlCol="0" anchor="b"/>
+          <a:lstStyle>
+            <a:lvl1pPr algn="r">
+              <a:defRPr sz="1200"/>
+            </a:lvl1pPr>
+          </a:lstStyle>
+          <a:p>
+            <a:fld id="{56C3FCE2-7B99-43A1-8332-C791CE80375A}" type="slidenum">
+              <a:rPr lang="en-US" smtClean="0"/>
+              <a:t>‹#›</a:t>
+            </a:fld>
+            <a:endParaRPr lang="en-US"/>
+          </a:p>
+        </p:txBody>
+      </p:sp>
+    </p:spTree>
+    <p:extLst>
+      <p:ext uri="{BB962C8B-B14F-4D97-AF65-F5344CB8AC3E}">
+        <p14:creationId xmlns:p14="http://schemas.microsoft.com/office/powerpoint/2010/main" val="2150745316"/>
+      </p:ext>
+    </p:extLst>
+  </p:cSld>
+  <p:clrMap bg1="lt1" tx1="dk1" bg2="lt2" tx2="dk2" accent1="accent1" accent2="accent2" accent3="accent3" accent4="accent4" accent5="accent5" accent6="accent6" hlink="hlink" folHlink="folHlink"/>
+  <p:notesStyle>
+    <a:lvl1pPr marL="0" algn="l" defTabSz="914400" rtl="0" eaLnBrk="1" latinLnBrk="0" hangingPunct="1">
+      <a:defRPr sz="1200" kern="1200">
+        <a:solidFill>
+          <a:schemeClr val="tx1"/>
+        </a:solidFill>
+        <a:latin typeface="+mn-lt"/>
+        <a:ea typeface="+mn-ea"/>
+        <a:cs typeface="+mn-cs"/>
+      </a:defRPr>
+    </a:lvl1pPr>
+    <a:lvl2pPr marL="457200" algn="l" defTabSz="914400" rtl="0" eaLnBrk="1" latinLnBrk="0" hangingPunct="1">
+      <a:defRPr sz="1200" kern="1200">
+        <a:solidFill>
+          <a:schemeClr val="tx1"/>
+        </a:solidFill>
+        <a:latin typeface="+mn-lt"/>
+        <a:ea typeface="+mn-ea"/>
+        <a:cs typeface="+mn-cs"/>
+      </a:defRPr>
+    </a:lvl2pPr>
+    <a:lvl3pPr marL="914400" algn="l" defTabSz="914400" rtl="0" eaLnBrk="1" latinLnBrk="0" hangingPunct="1">
+      <a:defRPr sz="1200" kern="1200">
+        <a:solidFill>
+          <a:schemeClr val="tx1"/>
+        </a:solidFill>
+        <a:latin typeface="+mn-lt"/>
+        <a:ea typeface="+mn-ea"/>
+        <a:cs typeface="+mn-cs"/>
+      </a:defRPr>
+    </a:lvl3pPr>
+    <a:lvl4pPr marL="1371600" algn="l" defTabSz="914400" rtl="0" eaLnBrk="1" latinLnBrk="0" hangingPunct="1">
+      <a:defRPr sz="1200" kern="1200">
+        <a:solidFill>
+          <a:schemeClr val="tx1"/>
+        </a:solidFill>
+        <a:latin typeface="+mn-lt"/>
+        <a:ea typeface="+mn-ea"/>
+        <a:cs typeface="+mn-cs"/>
+      </a:defRPr>
+    </a:lvl4pPr>
+    <a:lvl5pPr marL="1828800" algn="l" defTabSz="914400" rtl="0" eaLnBrk="1" latinLnBrk="0" hangingPunct="1">
+      <a:defRPr sz="1200" kern="1200">
+        <a:solidFill>
+          <a:schemeClr val="tx1"/>
+        </a:solidFill>
+        <a:latin typeface="+mn-lt"/>
+        <a:ea typeface="+mn-ea"/>
+        <a:cs typeface="+mn-cs"/>
+      </a:defRPr>
+    </a:lvl5pPr>
+    <a:lvl6pPr marL="2286000" algn="l" defTabSz="914400" rtl="0" eaLnBrk="1" latinLnBrk="0" hangingPunct="1">
+      <a:defRPr sz="1200" kern="1200">
+        <a:solidFill>
+          <a:schemeClr val="tx1"/>
+        </a:solidFill>
+        <a:latin typeface="+mn-lt"/>
+        <a:ea typeface="+mn-ea"/>
+        <a:cs typeface="+mn-cs"/>
+      </a:defRPr>
+    </a:lvl6pPr>
+    <a:lvl7pPr marL="2743200" algn="l" defTabSz="914400" rtl="0" eaLnBrk="1" latinLnBrk="0" hangingPunct="1">
+      <a:defRPr sz="1200" kern="1200">
+        <a:solidFill>
+          <a:schemeClr val="tx1"/>
+        </a:solidFill>
+        <a:latin typeface="+mn-lt"/>
+        <a:ea typeface="+mn-ea"/>
+        <a:cs typeface="+mn-cs"/>
+      </a:defRPr>
+    </a:lvl7pPr>
+    <a:lvl8pPr marL="3200400" algn="l" defTabSz="914400" rtl="0" eaLnBrk="1" latinLnBrk="0" hangingPunct="1">
+      <a:defRPr sz="1200" kern="1200">
+        <a:solidFill>
+          <a:schemeClr val="tx1"/>
+        </a:solidFill>
+        <a:latin typeface="+mn-lt"/>
+        <a:ea typeface="+mn-ea"/>
+        <a:cs typeface="+mn-cs"/>
+      </a:defRPr>
+    </a:lvl8pPr>
+    <a:lvl9pPr marL="3657600" algn="l" defTabSz="914400" rtl="0" eaLnBrk="1" latinLnBrk="0" hangingPunct="1">
+      <a:defRPr sz="1200" kern="1200">
+        <a:solidFill>
+          <a:schemeClr val="tx1"/>
+        </a:solidFill>
+        <a:latin typeface="+mn-lt"/>
+        <a:ea typeface="+mn-ea"/>
+        <a:cs typeface="+mn-cs"/>
+      </a:defRPr>
+    </a:lvl9pPr>
+  </p:notesStyle>
+</p:notesMaster>
+</file>
+
+<file path=ppt/notesSlides/notesSlide1.xml><?xml version="1.0" encoding="utf-8"?>
+<p:notes xmlns:a="http://schemas.openxmlformats.org/drawingml/2006/main" xmlns:r="http://schemas.openxmlformats.org/officeDocument/2006/relationships" xmlns:p="http://schemas.openxmlformats.org/presentationml/2006/main">
+  <p:cSld>
+    <p:spTree>
+      <p:nvGrpSpPr>
+        <p:cNvPr id="1" name=""/>
+        <p:cNvGrpSpPr/>
+        <p:nvPr/>
+      </p:nvGrpSpPr>
+      <p:grpSpPr>
+        <a:xfrm>
+          <a:off x="0" y="0"/>
+          <a:ext cx="0" cy="0"/>
+          <a:chOff x="0" y="0"/>
+          <a:chExt cx="0" cy="0"/>
+        </a:xfrm>
+      </p:grpSpPr>
+      <p:sp>
+        <p:nvSpPr>
+          <p:cNvPr id="2" name="Slide Image Placeholder 1"/>
+          <p:cNvSpPr>
+            <a:spLocks noGrp="1" noRot="1" noChangeAspect="1"/>
+          </p:cNvSpPr>
+          <p:nvPr>
+            <p:ph type="sldImg"/>
+          </p:nvPr>
+        </p:nvSpPr>
+        <p:spPr/>
+      </p:sp>
+      <p:sp>
+        <p:nvSpPr>
+          <p:cNvPr id="3" name="Notes Placeholder 2"/>
+          <p:cNvSpPr>
+            <a:spLocks noGrp="1"/>
+          </p:cNvSpPr>
+          <p:nvPr>
+            <p:ph type="body" idx="1"/>
+          </p:nvPr>
+        </p:nvSpPr>
+        <p:spPr/>
+        <p:txBody>
+          <a:bodyPr/>
+          <a:lstStyle/>
+          <a:p>
+            <a:r>
+              <a:rPr lang="en-US" dirty="0" err="1" smtClean="0"/>
+              <a:t>userFriendly</a:t>
+            </a:r>
+            <a:r>
+              <a:rPr lang="en-US" dirty="0" smtClean="0"/>
+              <a:t> through</a:t>
+            </a:r>
+            <a:r>
+              <a:rPr lang="en-US" baseline="0" dirty="0" smtClean="0"/>
+              <a:t> the</a:t>
+            </a:r>
+            <a:endParaRPr lang="en-US" dirty="0"/>
+          </a:p>
+        </p:txBody>
+      </p:sp>
+      <p:sp>
+        <p:nvSpPr>
+          <p:cNvPr id="4" name="Slide Number Placeholder 3"/>
+          <p:cNvSpPr>
+            <a:spLocks noGrp="1"/>
+          </p:cNvSpPr>
+          <p:nvPr>
+            <p:ph type="sldNum" sz="quarter" idx="10"/>
+          </p:nvPr>
+        </p:nvSpPr>
+        <p:spPr/>
+        <p:txBody>
+          <a:bodyPr/>
+          <a:lstStyle/>
+          <a:p>
+            <a:fld id="{56C3FCE2-7B99-43A1-8332-C791CE80375A}" type="slidenum">
+              <a:rPr lang="en-US" smtClean="0"/>
+              <a:t>2</a:t>
+            </a:fld>
+            <a:endParaRPr lang="en-US"/>
+          </a:p>
+        </p:txBody>
+      </p:sp>
+    </p:spTree>
+    <p:extLst>
+      <p:ext uri="{BB962C8B-B14F-4D97-AF65-F5344CB8AC3E}">
+        <p14:creationId xmlns:p14="http://schemas.microsoft.com/office/powerpoint/2010/main" val="896984512"/>
+      </p:ext>
+    </p:extLst>
+  </p:cSld>
+  <p:clrMapOvr>
+    <a:masterClrMapping/>
+  </p:clrMapOvr>
+</p:notes>
 </file>
 
 <file path=ppt/slideLayouts/slideLayout1.xml><?xml version="1.0" encoding="utf-8"?>
@@ -169,7 +623,7 @@
           <a:noFill/>
           <a:extLst>
             <a:ext uri="{909E8E84-426E-40dd-AFC4-6F175D3DCCD1}">
-              <a14:hiddenFill xmlns:a14="http://schemas.microsoft.com/office/drawing/2010/main" xmlns="">
+              <a14:hiddenFill xmlns="" xmlns:a14="http://schemas.microsoft.com/office/drawing/2010/main">
                 <a:solidFill>
                   <a:srgbClr val="FFFFFF"/>
                 </a:solidFill>
@@ -228,7 +682,7 @@
             </a:ln>
             <a:extLst>
               <a:ext uri="{91240B29-F687-4f45-9708-019B960494DF}">
-                <a14:hiddenLine xmlns:a14="http://schemas.microsoft.com/office/drawing/2010/main" xmlns="" w="9525">
+                <a14:hiddenLine xmlns="" xmlns:a14="http://schemas.microsoft.com/office/drawing/2010/main" w="9525">
                   <a:solidFill>
                     <a:srgbClr val="000000"/>
                   </a:solidFill>
@@ -318,7 +772,7 @@
             </a:ln>
             <a:extLst>
               <a:ext uri="{91240B29-F687-4f45-9708-019B960494DF}">
-                <a14:hiddenLine xmlns:a14="http://schemas.microsoft.com/office/drawing/2010/main" xmlns="" w="9525">
+                <a14:hiddenLine xmlns="" xmlns:a14="http://schemas.microsoft.com/office/drawing/2010/main" w="9525">
                   <a:solidFill>
                     <a:srgbClr val="000000"/>
                   </a:solidFill>
@@ -408,7 +862,7 @@
             </a:ln>
             <a:extLst>
               <a:ext uri="{91240B29-F687-4f45-9708-019B960494DF}">
-                <a14:hiddenLine xmlns:a14="http://schemas.microsoft.com/office/drawing/2010/main" xmlns="" w="9525">
+                <a14:hiddenLine xmlns="" xmlns:a14="http://schemas.microsoft.com/office/drawing/2010/main" w="9525">
                   <a:solidFill>
                     <a:srgbClr val="000000"/>
                   </a:solidFill>
@@ -442,7 +896,7 @@
             </a:ln>
             <a:extLst>
               <a:ext uri="{91240B29-F687-4f45-9708-019B960494DF}">
-                <a14:hiddenLine xmlns:a14="http://schemas.microsoft.com/office/drawing/2010/main" xmlns="" w="9525">
+                <a14:hiddenLine xmlns="" xmlns:a14="http://schemas.microsoft.com/office/drawing/2010/main" w="9525">
                   <a:solidFill>
                     <a:srgbClr val="000000"/>
                   </a:solidFill>
@@ -532,7 +986,7 @@
             </a:ln>
             <a:extLst>
               <a:ext uri="{91240B29-F687-4f45-9708-019B960494DF}">
-                <a14:hiddenLine xmlns:a14="http://schemas.microsoft.com/office/drawing/2010/main" xmlns="" w="9525">
+                <a14:hiddenLine xmlns="" xmlns:a14="http://schemas.microsoft.com/office/drawing/2010/main" w="9525">
                   <a:solidFill>
                     <a:srgbClr val="000000"/>
                   </a:solidFill>
@@ -594,7 +1048,7 @@
             </a:ln>
             <a:extLst>
               <a:ext uri="{91240B29-F687-4f45-9708-019B960494DF}">
-                <a14:hiddenLine xmlns:a14="http://schemas.microsoft.com/office/drawing/2010/main" xmlns="" w="9525">
+                <a14:hiddenLine xmlns="" xmlns:a14="http://schemas.microsoft.com/office/drawing/2010/main" w="9525">
                   <a:solidFill>
                     <a:srgbClr val="000000"/>
                   </a:solidFill>
@@ -656,7 +1110,7 @@
             </a:ln>
             <a:extLst>
               <a:ext uri="{91240B29-F687-4f45-9708-019B960494DF}">
-                <a14:hiddenLine xmlns:a14="http://schemas.microsoft.com/office/drawing/2010/main" xmlns="" w="9525">
+                <a14:hiddenLine xmlns="" xmlns:a14="http://schemas.microsoft.com/office/drawing/2010/main" w="9525">
                   <a:solidFill>
                     <a:srgbClr val="000000"/>
                   </a:solidFill>
@@ -746,7 +1200,7 @@
             </a:ln>
             <a:extLst>
               <a:ext uri="{91240B29-F687-4f45-9708-019B960494DF}">
-                <a14:hiddenLine xmlns:a14="http://schemas.microsoft.com/office/drawing/2010/main" xmlns="" w="9525">
+                <a14:hiddenLine xmlns="" xmlns:a14="http://schemas.microsoft.com/office/drawing/2010/main" w="9525">
                   <a:solidFill>
                     <a:srgbClr val="000000"/>
                   </a:solidFill>
@@ -808,7 +1262,7 @@
             </a:ln>
             <a:extLst>
               <a:ext uri="{91240B29-F687-4f45-9708-019B960494DF}">
-                <a14:hiddenLine xmlns:a14="http://schemas.microsoft.com/office/drawing/2010/main" xmlns="" w="9525">
+                <a14:hiddenLine xmlns="" xmlns:a14="http://schemas.microsoft.com/office/drawing/2010/main" w="9525">
                   <a:solidFill>
                     <a:srgbClr val="000000"/>
                   </a:solidFill>
@@ -870,7 +1324,7 @@
             </a:ln>
             <a:extLst>
               <a:ext uri="{91240B29-F687-4f45-9708-019B960494DF}">
-                <a14:hiddenLine xmlns:a14="http://schemas.microsoft.com/office/drawing/2010/main" xmlns="" w="9525">
+                <a14:hiddenLine xmlns="" xmlns:a14="http://schemas.microsoft.com/office/drawing/2010/main" w="9525">
                   <a:solidFill>
                     <a:srgbClr val="000000"/>
                   </a:solidFill>
@@ -960,7 +1414,7 @@
             </a:ln>
             <a:extLst>
               <a:ext uri="{91240B29-F687-4f45-9708-019B960494DF}">
-                <a14:hiddenLine xmlns:a14="http://schemas.microsoft.com/office/drawing/2010/main" xmlns="" w="9525">
+                <a14:hiddenLine xmlns="" xmlns:a14="http://schemas.microsoft.com/office/drawing/2010/main" w="9525">
                   <a:solidFill>
                     <a:srgbClr val="000000"/>
                   </a:solidFill>
@@ -1050,7 +1504,7 @@
             </a:ln>
             <a:extLst>
               <a:ext uri="{91240B29-F687-4f45-9708-019B960494DF}">
-                <a14:hiddenLine xmlns:a14="http://schemas.microsoft.com/office/drawing/2010/main" xmlns="" w="9525">
+                <a14:hiddenLine xmlns="" xmlns:a14="http://schemas.microsoft.com/office/drawing/2010/main" w="9525">
                   <a:solidFill>
                     <a:srgbClr val="000000"/>
                   </a:solidFill>
@@ -1112,7 +1566,7 @@
             </a:ln>
             <a:extLst>
               <a:ext uri="{91240B29-F687-4f45-9708-019B960494DF}">
-                <a14:hiddenLine xmlns:a14="http://schemas.microsoft.com/office/drawing/2010/main" xmlns="" w="9525">
+                <a14:hiddenLine xmlns="" xmlns:a14="http://schemas.microsoft.com/office/drawing/2010/main" w="9525">
                   <a:solidFill>
                     <a:srgbClr val="000000"/>
                   </a:solidFill>
@@ -1222,7 +1676,7 @@
             </a:ln>
             <a:extLst>
               <a:ext uri="{91240B29-F687-4f45-9708-019B960494DF}">
-                <a14:hiddenLine xmlns:a14="http://schemas.microsoft.com/office/drawing/2010/main" xmlns="" w="9525">
+                <a14:hiddenLine xmlns="" xmlns:a14="http://schemas.microsoft.com/office/drawing/2010/main" w="9525">
                   <a:solidFill>
                     <a:srgbClr val="000000"/>
                   </a:solidFill>
@@ -1284,7 +1738,7 @@
             </a:ln>
             <a:extLst>
               <a:ext uri="{91240B29-F687-4f45-9708-019B960494DF}">
-                <a14:hiddenLine xmlns:a14="http://schemas.microsoft.com/office/drawing/2010/main" xmlns="" w="9525">
+                <a14:hiddenLine xmlns="" xmlns:a14="http://schemas.microsoft.com/office/drawing/2010/main" w="9525">
                   <a:solidFill>
                     <a:srgbClr val="000000"/>
                   </a:solidFill>
@@ -1374,7 +1828,7 @@
             </a:ln>
             <a:extLst>
               <a:ext uri="{91240B29-F687-4f45-9708-019B960494DF}">
-                <a14:hiddenLine xmlns:a14="http://schemas.microsoft.com/office/drawing/2010/main" xmlns="" w="9525">
+                <a14:hiddenLine xmlns="" xmlns:a14="http://schemas.microsoft.com/office/drawing/2010/main" w="9525">
                   <a:solidFill>
                     <a:srgbClr val="000000"/>
                   </a:solidFill>
@@ -1464,7 +1918,7 @@
             </a:ln>
             <a:extLst>
               <a:ext uri="{91240B29-F687-4f45-9708-019B960494DF}">
-                <a14:hiddenLine xmlns:a14="http://schemas.microsoft.com/office/drawing/2010/main" xmlns="" w="9525">
+                <a14:hiddenLine xmlns="" xmlns:a14="http://schemas.microsoft.com/office/drawing/2010/main" w="9525">
                   <a:solidFill>
                     <a:srgbClr val="000000"/>
                   </a:solidFill>
@@ -1526,7 +1980,7 @@
             </a:ln>
             <a:extLst>
               <a:ext uri="{91240B29-F687-4f45-9708-019B960494DF}">
-                <a14:hiddenLine xmlns:a14="http://schemas.microsoft.com/office/drawing/2010/main" xmlns="" w="9525">
+                <a14:hiddenLine xmlns="" xmlns:a14="http://schemas.microsoft.com/office/drawing/2010/main" w="9525">
                   <a:solidFill>
                     <a:srgbClr val="000000"/>
                   </a:solidFill>
@@ -1616,7 +2070,7 @@
             </a:ln>
             <a:extLst>
               <a:ext uri="{91240B29-F687-4f45-9708-019B960494DF}">
-                <a14:hiddenLine xmlns:a14="http://schemas.microsoft.com/office/drawing/2010/main" xmlns="" w="9525">
+                <a14:hiddenLine xmlns="" xmlns:a14="http://schemas.microsoft.com/office/drawing/2010/main" w="9525">
                   <a:solidFill>
                     <a:srgbClr val="000000"/>
                   </a:solidFill>
@@ -1706,7 +2160,7 @@
             </a:ln>
             <a:extLst>
               <a:ext uri="{91240B29-F687-4f45-9708-019B960494DF}">
-                <a14:hiddenLine xmlns:a14="http://schemas.microsoft.com/office/drawing/2010/main" xmlns="" w="9525">
+                <a14:hiddenLine xmlns="" xmlns:a14="http://schemas.microsoft.com/office/drawing/2010/main" w="9525">
                   <a:solidFill>
                     <a:srgbClr val="000000"/>
                   </a:solidFill>
@@ -1762,7 +2216,7 @@
             </a:ln>
             <a:extLst>
               <a:ext uri="{91240B29-F687-4f45-9708-019B960494DF}">
-                <a14:hiddenLine xmlns:a14="http://schemas.microsoft.com/office/drawing/2010/main" xmlns="" w="9525">
+                <a14:hiddenLine xmlns="" xmlns:a14="http://schemas.microsoft.com/office/drawing/2010/main" w="9525">
                   <a:solidFill>
                     <a:srgbClr val="000000"/>
                   </a:solidFill>
@@ -1852,7 +2306,7 @@
             </a:ln>
             <a:extLst>
               <a:ext uri="{91240B29-F687-4f45-9708-019B960494DF}">
-                <a14:hiddenLine xmlns:a14="http://schemas.microsoft.com/office/drawing/2010/main" xmlns="" w="9525">
+                <a14:hiddenLine xmlns="" xmlns:a14="http://schemas.microsoft.com/office/drawing/2010/main" w="9525">
                   <a:solidFill>
                     <a:srgbClr val="000000"/>
                   </a:solidFill>
@@ -1908,7 +2362,7 @@
             </a:ln>
             <a:extLst>
               <a:ext uri="{91240B29-F687-4f45-9708-019B960494DF}">
-                <a14:hiddenLine xmlns:a14="http://schemas.microsoft.com/office/drawing/2010/main" xmlns="" w="9525">
+                <a14:hiddenLine xmlns="" xmlns:a14="http://schemas.microsoft.com/office/drawing/2010/main" w="9525">
                   <a:solidFill>
                     <a:srgbClr val="000000"/>
                   </a:solidFill>
@@ -1998,7 +2452,7 @@
             </a:ln>
             <a:extLst>
               <a:ext uri="{91240B29-F687-4f45-9708-019B960494DF}">
-                <a14:hiddenLine xmlns:a14="http://schemas.microsoft.com/office/drawing/2010/main" xmlns="" w="9525">
+                <a14:hiddenLine xmlns="" xmlns:a14="http://schemas.microsoft.com/office/drawing/2010/main" w="9525">
                   <a:solidFill>
                     <a:srgbClr val="000000"/>
                   </a:solidFill>
@@ -2066,7 +2520,7 @@
             </a:ln>
             <a:extLst>
               <a:ext uri="{91240B29-F687-4f45-9708-019B960494DF}">
-                <a14:hiddenLine xmlns:a14="http://schemas.microsoft.com/office/drawing/2010/main" xmlns="" w="9525">
+                <a14:hiddenLine xmlns="" xmlns:a14="http://schemas.microsoft.com/office/drawing/2010/main" w="9525">
                   <a:solidFill>
                     <a:srgbClr val="000000"/>
                   </a:solidFill>
@@ -2156,7 +2610,7 @@
             </a:ln>
             <a:extLst>
               <a:ext uri="{91240B29-F687-4f45-9708-019B960494DF}">
-                <a14:hiddenLine xmlns:a14="http://schemas.microsoft.com/office/drawing/2010/main" xmlns="" w="9525">
+                <a14:hiddenLine xmlns="" xmlns:a14="http://schemas.microsoft.com/office/drawing/2010/main" w="9525">
                   <a:solidFill>
                     <a:srgbClr val="000000"/>
                   </a:solidFill>
@@ -2224,7 +2678,7 @@
             </a:ln>
             <a:extLst>
               <a:ext uri="{91240B29-F687-4f45-9708-019B960494DF}">
-                <a14:hiddenLine xmlns:a14="http://schemas.microsoft.com/office/drawing/2010/main" xmlns="" w="9525">
+                <a14:hiddenLine xmlns="" xmlns:a14="http://schemas.microsoft.com/office/drawing/2010/main" w="9525">
                   <a:solidFill>
                     <a:srgbClr val="000000"/>
                   </a:solidFill>
@@ -2314,7 +2768,7 @@
             </a:ln>
             <a:extLst>
               <a:ext uri="{91240B29-F687-4f45-9708-019B960494DF}">
-                <a14:hiddenLine xmlns:a14="http://schemas.microsoft.com/office/drawing/2010/main" xmlns="" w="9525">
+                <a14:hiddenLine xmlns="" xmlns:a14="http://schemas.microsoft.com/office/drawing/2010/main" w="9525">
                   <a:solidFill>
                     <a:srgbClr val="000000"/>
                   </a:solidFill>
@@ -2348,7 +2802,7 @@
             </a:ln>
             <a:extLst>
               <a:ext uri="{91240B29-F687-4f45-9708-019B960494DF}">
-                <a14:hiddenLine xmlns:a14="http://schemas.microsoft.com/office/drawing/2010/main" xmlns="" w="9525">
+                <a14:hiddenLine xmlns="" xmlns:a14="http://schemas.microsoft.com/office/drawing/2010/main" w="9525">
                   <a:solidFill>
                     <a:srgbClr val="000000"/>
                   </a:solidFill>
@@ -2438,7 +2892,7 @@
             </a:ln>
             <a:extLst>
               <a:ext uri="{91240B29-F687-4f45-9708-019B960494DF}">
-                <a14:hiddenLine xmlns:a14="http://schemas.microsoft.com/office/drawing/2010/main" xmlns="" w="9525">
+                <a14:hiddenLine xmlns="" xmlns:a14="http://schemas.microsoft.com/office/drawing/2010/main" w="9525">
                   <a:solidFill>
                     <a:srgbClr val="000000"/>
                   </a:solidFill>
@@ -2500,7 +2954,7 @@
             </a:ln>
             <a:extLst>
               <a:ext uri="{91240B29-F687-4f45-9708-019B960494DF}">
-                <a14:hiddenLine xmlns:a14="http://schemas.microsoft.com/office/drawing/2010/main" xmlns="" w="9525">
+                <a14:hiddenLine xmlns="" xmlns:a14="http://schemas.microsoft.com/office/drawing/2010/main" w="9525">
                   <a:solidFill>
                     <a:srgbClr val="000000"/>
                   </a:solidFill>
@@ -2562,7 +3016,7 @@
             </a:ln>
             <a:extLst>
               <a:ext uri="{91240B29-F687-4f45-9708-019B960494DF}">
-                <a14:hiddenLine xmlns:a14="http://schemas.microsoft.com/office/drawing/2010/main" xmlns="" w="9525">
+                <a14:hiddenLine xmlns="" xmlns:a14="http://schemas.microsoft.com/office/drawing/2010/main" w="9525">
                   <a:solidFill>
                     <a:srgbClr val="000000"/>
                   </a:solidFill>
@@ -2652,7 +3106,7 @@
             </a:ln>
             <a:extLst>
               <a:ext uri="{91240B29-F687-4f45-9708-019B960494DF}">
-                <a14:hiddenLine xmlns:a14="http://schemas.microsoft.com/office/drawing/2010/main" xmlns="" w="9525">
+                <a14:hiddenLine xmlns="" xmlns:a14="http://schemas.microsoft.com/office/drawing/2010/main" w="9525">
                   <a:solidFill>
                     <a:srgbClr val="000000"/>
                   </a:solidFill>
@@ -2720,7 +3174,7 @@
             </a:ln>
             <a:extLst>
               <a:ext uri="{91240B29-F687-4f45-9708-019B960494DF}">
-                <a14:hiddenLine xmlns:a14="http://schemas.microsoft.com/office/drawing/2010/main" xmlns="" w="9525">
+                <a14:hiddenLine xmlns="" xmlns:a14="http://schemas.microsoft.com/office/drawing/2010/main" w="9525">
                   <a:solidFill>
                     <a:srgbClr val="000000"/>
                   </a:solidFill>
@@ -2782,7 +3236,7 @@
             </a:ln>
             <a:extLst>
               <a:ext uri="{91240B29-F687-4f45-9708-019B960494DF}">
-                <a14:hiddenLine xmlns:a14="http://schemas.microsoft.com/office/drawing/2010/main" xmlns="" w="9525">
+                <a14:hiddenLine xmlns="" xmlns:a14="http://schemas.microsoft.com/office/drawing/2010/main" w="9525">
                   <a:solidFill>
                     <a:srgbClr val="000000"/>
                   </a:solidFill>
@@ -2872,7 +3326,7 @@
             </a:ln>
             <a:extLst>
               <a:ext uri="{91240B29-F687-4f45-9708-019B960494DF}">
-                <a14:hiddenLine xmlns:a14="http://schemas.microsoft.com/office/drawing/2010/main" xmlns="" w="9525">
+                <a14:hiddenLine xmlns="" xmlns:a14="http://schemas.microsoft.com/office/drawing/2010/main" w="9525">
                   <a:solidFill>
                     <a:srgbClr val="000000"/>
                   </a:solidFill>
@@ -2934,7 +3388,7 @@
             </a:ln>
             <a:extLst>
               <a:ext uri="{91240B29-F687-4f45-9708-019B960494DF}">
-                <a14:hiddenLine xmlns:a14="http://schemas.microsoft.com/office/drawing/2010/main" xmlns="" w="9525">
+                <a14:hiddenLine xmlns="" xmlns:a14="http://schemas.microsoft.com/office/drawing/2010/main" w="9525">
                   <a:solidFill>
                     <a:srgbClr val="000000"/>
                   </a:solidFill>
@@ -3024,7 +3478,7 @@
             </a:ln>
             <a:extLst>
               <a:ext uri="{91240B29-F687-4f45-9708-019B960494DF}">
-                <a14:hiddenLine xmlns:a14="http://schemas.microsoft.com/office/drawing/2010/main" xmlns="" w="9525">
+                <a14:hiddenLine xmlns="" xmlns:a14="http://schemas.microsoft.com/office/drawing/2010/main" w="9525">
                   <a:solidFill>
                     <a:srgbClr val="000000"/>
                   </a:solidFill>
@@ -3086,7 +3540,7 @@
             </a:ln>
             <a:extLst>
               <a:ext uri="{91240B29-F687-4f45-9708-019B960494DF}">
-                <a14:hiddenLine xmlns:a14="http://schemas.microsoft.com/office/drawing/2010/main" xmlns="" w="9525">
+                <a14:hiddenLine xmlns="" xmlns:a14="http://schemas.microsoft.com/office/drawing/2010/main" w="9525">
                   <a:solidFill>
                     <a:srgbClr val="000000"/>
                   </a:solidFill>
@@ -3176,7 +3630,7 @@
             </a:ln>
             <a:extLst>
               <a:ext uri="{91240B29-F687-4f45-9708-019B960494DF}">
-                <a14:hiddenLine xmlns:a14="http://schemas.microsoft.com/office/drawing/2010/main" xmlns="" w="9525">
+                <a14:hiddenLine xmlns="" xmlns:a14="http://schemas.microsoft.com/office/drawing/2010/main" w="9525">
                   <a:solidFill>
                     <a:srgbClr val="000000"/>
                   </a:solidFill>
@@ -3210,7 +3664,7 @@
             </a:ln>
             <a:extLst>
               <a:ext uri="{91240B29-F687-4f45-9708-019B960494DF}">
-                <a14:hiddenLine xmlns:a14="http://schemas.microsoft.com/office/drawing/2010/main" xmlns="" w="9525">
+                <a14:hiddenLine xmlns="" xmlns:a14="http://schemas.microsoft.com/office/drawing/2010/main" w="9525">
                   <a:solidFill>
                     <a:srgbClr val="000000"/>
                   </a:solidFill>
@@ -3275,7 +3729,7 @@
             </a:ln>
             <a:extLst>
               <a:ext uri="{91240B29-F687-4f45-9708-019B960494DF}">
-                <a14:hiddenLine xmlns:a14="http://schemas.microsoft.com/office/drawing/2010/main" xmlns="" w="9525">
+                <a14:hiddenLine xmlns="" xmlns:a14="http://schemas.microsoft.com/office/drawing/2010/main" w="9525">
                   <a:solidFill>
                     <a:srgbClr val="000000"/>
                   </a:solidFill>
@@ -3365,7 +3819,7 @@
             </a:ln>
             <a:extLst>
               <a:ext uri="{91240B29-F687-4f45-9708-019B960494DF}">
-                <a14:hiddenLine xmlns:a14="http://schemas.microsoft.com/office/drawing/2010/main" xmlns="" w="9525">
+                <a14:hiddenLine xmlns="" xmlns:a14="http://schemas.microsoft.com/office/drawing/2010/main" w="9525">
                   <a:solidFill>
                     <a:srgbClr val="000000"/>
                   </a:solidFill>
@@ -3427,7 +3881,7 @@
             </a:ln>
             <a:extLst>
               <a:ext uri="{91240B29-F687-4f45-9708-019B960494DF}">
-                <a14:hiddenLine xmlns:a14="http://schemas.microsoft.com/office/drawing/2010/main" xmlns="" w="9525">
+                <a14:hiddenLine xmlns="" xmlns:a14="http://schemas.microsoft.com/office/drawing/2010/main" w="9525">
                   <a:solidFill>
                     <a:srgbClr val="000000"/>
                   </a:solidFill>
@@ -3517,7 +3971,7 @@
             </a:ln>
             <a:extLst>
               <a:ext uri="{91240B29-F687-4f45-9708-019B960494DF}">
-                <a14:hiddenLine xmlns:a14="http://schemas.microsoft.com/office/drawing/2010/main" xmlns="" w="9525">
+                <a14:hiddenLine xmlns="" xmlns:a14="http://schemas.microsoft.com/office/drawing/2010/main" w="9525">
                   <a:solidFill>
                     <a:srgbClr val="000000"/>
                   </a:solidFill>
@@ -3607,7 +4061,7 @@
             </a:ln>
             <a:extLst>
               <a:ext uri="{91240B29-F687-4f45-9708-019B960494DF}">
-                <a14:hiddenLine xmlns:a14="http://schemas.microsoft.com/office/drawing/2010/main" xmlns="" w="9525">
+                <a14:hiddenLine xmlns="" xmlns:a14="http://schemas.microsoft.com/office/drawing/2010/main" w="9525">
                   <a:solidFill>
                     <a:srgbClr val="000000"/>
                   </a:solidFill>
@@ -3672,7 +4126,7 @@
             </a:ln>
             <a:extLst>
               <a:ext uri="{91240B29-F687-4f45-9708-019B960494DF}">
-                <a14:hiddenLine xmlns:a14="http://schemas.microsoft.com/office/drawing/2010/main" xmlns="" w="9525">
+                <a14:hiddenLine xmlns="" xmlns:a14="http://schemas.microsoft.com/office/drawing/2010/main" w="9525">
                   <a:solidFill>
                     <a:srgbClr val="000000"/>
                   </a:solidFill>
@@ -3734,7 +4188,7 @@
             </a:ln>
             <a:extLst>
               <a:ext uri="{91240B29-F687-4f45-9708-019B960494DF}">
-                <a14:hiddenLine xmlns:a14="http://schemas.microsoft.com/office/drawing/2010/main" xmlns="" w="9525">
+                <a14:hiddenLine xmlns="" xmlns:a14="http://schemas.microsoft.com/office/drawing/2010/main" w="9525">
                   <a:solidFill>
                     <a:srgbClr val="000000"/>
                   </a:solidFill>
@@ -3824,7 +4278,7 @@
             </a:ln>
             <a:extLst>
               <a:ext uri="{91240B29-F687-4f45-9708-019B960494DF}">
-                <a14:hiddenLine xmlns:a14="http://schemas.microsoft.com/office/drawing/2010/main" xmlns="" w="9525">
+                <a14:hiddenLine xmlns="" xmlns:a14="http://schemas.microsoft.com/office/drawing/2010/main" w="9525">
                   <a:solidFill>
                     <a:srgbClr val="000000"/>
                   </a:solidFill>
@@ -3914,7 +4368,7 @@
             </a:ln>
             <a:extLst>
               <a:ext uri="{91240B29-F687-4f45-9708-019B960494DF}">
-                <a14:hiddenLine xmlns:a14="http://schemas.microsoft.com/office/drawing/2010/main" xmlns="" w="9525">
+                <a14:hiddenLine xmlns="" xmlns:a14="http://schemas.microsoft.com/office/drawing/2010/main" w="9525">
                   <a:solidFill>
                     <a:srgbClr val="000000"/>
                   </a:solidFill>
@@ -3976,7 +4430,7 @@
             </a:ln>
             <a:extLst>
               <a:ext uri="{91240B29-F687-4f45-9708-019B960494DF}">
-                <a14:hiddenLine xmlns:a14="http://schemas.microsoft.com/office/drawing/2010/main" xmlns="" w="9525">
+                <a14:hiddenLine xmlns="" xmlns:a14="http://schemas.microsoft.com/office/drawing/2010/main" w="9525">
                   <a:solidFill>
                     <a:srgbClr val="000000"/>
                   </a:solidFill>
@@ -4096,7 +4550,7 @@
             </a:ln>
             <a:extLst>
               <a:ext uri="{91240B29-F687-4f45-9708-019B960494DF}">
-                <a14:hiddenLine xmlns:a14="http://schemas.microsoft.com/office/drawing/2010/main" xmlns="" w="9525">
+                <a14:hiddenLine xmlns="" xmlns:a14="http://schemas.microsoft.com/office/drawing/2010/main" w="9525">
                   <a:solidFill>
                     <a:srgbClr val="000000"/>
                   </a:solidFill>
@@ -4164,7 +4618,7 @@
             </a:ln>
             <a:extLst>
               <a:ext uri="{91240B29-F687-4f45-9708-019B960494DF}">
-                <a14:hiddenLine xmlns:a14="http://schemas.microsoft.com/office/drawing/2010/main" xmlns="" w="9525">
+                <a14:hiddenLine xmlns="" xmlns:a14="http://schemas.microsoft.com/office/drawing/2010/main" w="9525">
                   <a:solidFill>
                     <a:srgbClr val="000000"/>
                   </a:solidFill>
@@ -4254,7 +4708,7 @@
             </a:ln>
             <a:extLst>
               <a:ext uri="{91240B29-F687-4f45-9708-019B960494DF}">
-                <a14:hiddenLine xmlns:a14="http://schemas.microsoft.com/office/drawing/2010/main" xmlns="" w="9525">
+                <a14:hiddenLine xmlns="" xmlns:a14="http://schemas.microsoft.com/office/drawing/2010/main" w="9525">
                   <a:solidFill>
                     <a:srgbClr val="000000"/>
                   </a:solidFill>
@@ -4394,7 +4848,7 @@
           <a:p>
             <a:fld id="{48A87A34-81AB-432B-8DAE-1953F412C126}" type="datetimeFigureOut">
               <a:rPr lang="en-US" dirty="0"/>
-              <a:t>3/9/2020</a:t>
+              <a:t>3/10/2020</a:t>
             </a:fld>
             <a:endParaRPr lang="en-US" dirty="0"/>
           </a:p>
@@ -4656,7 +5110,7 @@
           <a:p>
             <a:fld id="{48A87A34-81AB-432B-8DAE-1953F412C126}" type="datetimeFigureOut">
               <a:rPr lang="en-US" dirty="0"/>
-              <a:t>3/9/2020</a:t>
+              <a:t>3/10/2020</a:t>
             </a:fld>
             <a:endParaRPr lang="en-US" dirty="0"/>
           </a:p>
@@ -4847,7 +5301,7 @@
           <a:p>
             <a:fld id="{48A87A34-81AB-432B-8DAE-1953F412C126}" type="datetimeFigureOut">
               <a:rPr lang="en-US" dirty="0"/>
-              <a:t>3/9/2020</a:t>
+              <a:t>3/10/2020</a:t>
             </a:fld>
             <a:endParaRPr lang="en-US" dirty="0"/>
           </a:p>
@@ -5105,7 +5559,7 @@
           <a:p>
             <a:fld id="{48A87A34-81AB-432B-8DAE-1953F412C126}" type="datetimeFigureOut">
               <a:rPr lang="en-US" dirty="0"/>
-              <a:t>3/9/2020</a:t>
+              <a:t>3/10/2020</a:t>
             </a:fld>
             <a:endParaRPr lang="en-US" dirty="0"/>
           </a:p>
@@ -5534,7 +5988,7 @@
           <a:p>
             <a:fld id="{48A87A34-81AB-432B-8DAE-1953F412C126}" type="datetimeFigureOut">
               <a:rPr lang="en-US" dirty="0"/>
-              <a:t>3/9/2020</a:t>
+              <a:t>3/10/2020</a:t>
             </a:fld>
             <a:endParaRPr lang="en-US" dirty="0"/>
           </a:p>
@@ -6075,7 +6529,7 @@
           <a:p>
             <a:fld id="{48A87A34-81AB-432B-8DAE-1953F412C126}" type="datetimeFigureOut">
               <a:rPr lang="en-US" dirty="0"/>
-              <a:t>3/9/2020</a:t>
+              <a:t>3/10/2020</a:t>
             </a:fld>
             <a:endParaRPr lang="en-US" dirty="0"/>
           </a:p>
@@ -6790,7 +7244,7 @@
           <a:p>
             <a:fld id="{48A87A34-81AB-432B-8DAE-1953F412C126}" type="datetimeFigureOut">
               <a:rPr lang="en-US" dirty="0"/>
-              <a:t>3/9/2020</a:t>
+              <a:t>3/10/2020</a:t>
             </a:fld>
             <a:endParaRPr lang="en-US" dirty="0"/>
           </a:p>
@@ -6955,7 +7409,7 @@
           <a:p>
             <a:fld id="{48A87A34-81AB-432B-8DAE-1953F412C126}" type="datetimeFigureOut">
               <a:rPr lang="en-US" dirty="0"/>
-              <a:t>3/9/2020</a:t>
+              <a:t>3/10/2020</a:t>
             </a:fld>
             <a:endParaRPr lang="en-US" dirty="0"/>
           </a:p>
@@ -7130,7 +7584,7 @@
           <a:p>
             <a:fld id="{48A87A34-81AB-432B-8DAE-1953F412C126}" type="datetimeFigureOut">
               <a:rPr lang="en-US" dirty="0"/>
-              <a:t>3/9/2020</a:t>
+              <a:t>3/10/2020</a:t>
             </a:fld>
             <a:endParaRPr lang="en-US" dirty="0"/>
           </a:p>
@@ -7295,7 +7749,7 @@
           <a:p>
             <a:fld id="{48A87A34-81AB-432B-8DAE-1953F412C126}" type="datetimeFigureOut">
               <a:rPr lang="en-US" dirty="0"/>
-              <a:t>3/9/2020</a:t>
+              <a:t>3/10/2020</a:t>
             </a:fld>
             <a:endParaRPr lang="en-US" dirty="0"/>
           </a:p>
@@ -7540,7 +7994,7 @@
           <a:p>
             <a:fld id="{48A87A34-81AB-432B-8DAE-1953F412C126}" type="datetimeFigureOut">
               <a:rPr lang="en-US" dirty="0"/>
-              <a:t>3/9/2020</a:t>
+              <a:t>3/10/2020</a:t>
             </a:fld>
             <a:endParaRPr lang="en-US" dirty="0"/>
           </a:p>
@@ -7767,7 +8221,7 @@
           <a:p>
             <a:fld id="{48A87A34-81AB-432B-8DAE-1953F412C126}" type="datetimeFigureOut">
               <a:rPr lang="en-US" dirty="0"/>
-              <a:t>3/9/2020</a:t>
+              <a:t>3/10/2020</a:t>
             </a:fld>
             <a:endParaRPr lang="en-US" dirty="0"/>
           </a:p>
@@ -8143,7 +8597,7 @@
           <a:p>
             <a:fld id="{48A87A34-81AB-432B-8DAE-1953F412C126}" type="datetimeFigureOut">
               <a:rPr lang="en-US" dirty="0"/>
-              <a:t>3/9/2020</a:t>
+              <a:t>3/10/2020</a:t>
             </a:fld>
             <a:endParaRPr lang="en-US" dirty="0"/>
           </a:p>
@@ -8256,7 +8710,7 @@
           <a:p>
             <a:fld id="{48A87A34-81AB-432B-8DAE-1953F412C126}" type="datetimeFigureOut">
               <a:rPr lang="en-US" dirty="0"/>
-              <a:t>3/9/2020</a:t>
+              <a:t>3/10/2020</a:t>
             </a:fld>
             <a:endParaRPr lang="en-US" dirty="0"/>
           </a:p>
@@ -8346,7 +8800,7 @@
           <a:p>
             <a:fld id="{48A87A34-81AB-432B-8DAE-1953F412C126}" type="datetimeFigureOut">
               <a:rPr lang="en-US" dirty="0"/>
-              <a:t>3/9/2020</a:t>
+              <a:t>3/10/2020</a:t>
             </a:fld>
             <a:endParaRPr lang="en-US" dirty="0"/>
           </a:p>
@@ -8590,7 +9044,7 @@
           <a:p>
             <a:fld id="{48A87A34-81AB-432B-8DAE-1953F412C126}" type="datetimeFigureOut">
               <a:rPr lang="en-US" dirty="0"/>
-              <a:t>3/9/2020</a:t>
+              <a:t>3/10/2020</a:t>
             </a:fld>
             <a:endParaRPr lang="en-US" dirty="0"/>
           </a:p>
@@ -8865,7 +9319,7 @@
           <a:p>
             <a:fld id="{48A87A34-81AB-432B-8DAE-1953F412C126}" type="datetimeFigureOut">
               <a:rPr lang="en-US" dirty="0"/>
-              <a:t>3/9/2020</a:t>
+              <a:t>3/10/2020</a:t>
             </a:fld>
             <a:endParaRPr lang="en-US" dirty="0"/>
           </a:p>
@@ -8983,7 +9437,7 @@
           <a:noFill/>
           <a:extLst>
             <a:ext uri="{909E8E84-426E-40dd-AFC4-6F175D3DCCD1}">
-              <a14:hiddenFill xmlns:a14="http://schemas.microsoft.com/office/drawing/2010/main" xmlns="">
+              <a14:hiddenFill xmlns="" xmlns:a14="http://schemas.microsoft.com/office/drawing/2010/main">
                 <a:solidFill>
                   <a:srgbClr val="FFFFFF"/>
                 </a:solidFill>
@@ -9057,7 +9511,7 @@
               </a:ln>
               <a:extLst>
                 <a:ext uri="{91240B29-F687-4f45-9708-019B960494DF}">
-                  <a14:hiddenLine xmlns:a14="http://schemas.microsoft.com/office/drawing/2010/main" xmlns="" w="9525">
+                  <a14:hiddenLine xmlns="" xmlns:a14="http://schemas.microsoft.com/office/drawing/2010/main" w="9525">
                     <a:solidFill>
                       <a:srgbClr val="000000"/>
                     </a:solidFill>
@@ -9147,7 +9601,7 @@
               </a:ln>
               <a:extLst>
                 <a:ext uri="{91240B29-F687-4f45-9708-019B960494DF}">
-                  <a14:hiddenLine xmlns:a14="http://schemas.microsoft.com/office/drawing/2010/main" xmlns="" w="9525">
+                  <a14:hiddenLine xmlns="" xmlns:a14="http://schemas.microsoft.com/office/drawing/2010/main" w="9525">
                     <a:solidFill>
                       <a:srgbClr val="000000"/>
                     </a:solidFill>
@@ -9237,7 +9691,7 @@
               </a:ln>
               <a:extLst>
                 <a:ext uri="{91240B29-F687-4f45-9708-019B960494DF}">
-                  <a14:hiddenLine xmlns:a14="http://schemas.microsoft.com/office/drawing/2010/main" xmlns="" w="9525">
+                  <a14:hiddenLine xmlns="" xmlns:a14="http://schemas.microsoft.com/office/drawing/2010/main" w="9525">
                     <a:solidFill>
                       <a:srgbClr val="000000"/>
                     </a:solidFill>
@@ -9299,7 +9753,7 @@
               </a:ln>
               <a:extLst>
                 <a:ext uri="{91240B29-F687-4f45-9708-019B960494DF}">
-                  <a14:hiddenLine xmlns:a14="http://schemas.microsoft.com/office/drawing/2010/main" xmlns="" w="9525">
+                  <a14:hiddenLine xmlns="" xmlns:a14="http://schemas.microsoft.com/office/drawing/2010/main" w="9525">
                     <a:solidFill>
                       <a:srgbClr val="000000"/>
                     </a:solidFill>
@@ -9389,7 +9843,7 @@
               </a:ln>
               <a:extLst>
                 <a:ext uri="{91240B29-F687-4f45-9708-019B960494DF}">
-                  <a14:hiddenLine xmlns:a14="http://schemas.microsoft.com/office/drawing/2010/main" xmlns="" w="9525">
+                  <a14:hiddenLine xmlns="" xmlns:a14="http://schemas.microsoft.com/office/drawing/2010/main" w="9525">
                     <a:solidFill>
                       <a:srgbClr val="000000"/>
                     </a:solidFill>
@@ -9451,7 +9905,7 @@
               </a:ln>
               <a:extLst>
                 <a:ext uri="{91240B29-F687-4f45-9708-019B960494DF}">
-                  <a14:hiddenLine xmlns:a14="http://schemas.microsoft.com/office/drawing/2010/main" xmlns="" w="9525">
+                  <a14:hiddenLine xmlns="" xmlns:a14="http://schemas.microsoft.com/office/drawing/2010/main" w="9525">
                     <a:solidFill>
                       <a:srgbClr val="000000"/>
                     </a:solidFill>
@@ -9513,7 +9967,7 @@
               </a:ln>
               <a:extLst>
                 <a:ext uri="{91240B29-F687-4f45-9708-019B960494DF}">
-                  <a14:hiddenLine xmlns:a14="http://schemas.microsoft.com/office/drawing/2010/main" xmlns="" w="9525">
+                  <a14:hiddenLine xmlns="" xmlns:a14="http://schemas.microsoft.com/office/drawing/2010/main" w="9525">
                     <a:solidFill>
                       <a:srgbClr val="000000"/>
                     </a:solidFill>
@@ -9603,7 +10057,7 @@
               </a:ln>
               <a:extLst>
                 <a:ext uri="{91240B29-F687-4f45-9708-019B960494DF}">
-                  <a14:hiddenLine xmlns:a14="http://schemas.microsoft.com/office/drawing/2010/main" xmlns="" w="9525">
+                  <a14:hiddenLine xmlns="" xmlns:a14="http://schemas.microsoft.com/office/drawing/2010/main" w="9525">
                     <a:solidFill>
                       <a:srgbClr val="000000"/>
                     </a:solidFill>
@@ -9693,7 +10147,7 @@
               </a:ln>
               <a:extLst>
                 <a:ext uri="{91240B29-F687-4f45-9708-019B960494DF}">
-                  <a14:hiddenLine xmlns:a14="http://schemas.microsoft.com/office/drawing/2010/main" xmlns="" w="9525">
+                  <a14:hiddenLine xmlns="" xmlns:a14="http://schemas.microsoft.com/office/drawing/2010/main" w="9525">
                     <a:solidFill>
                       <a:srgbClr val="000000"/>
                     </a:solidFill>
@@ -9755,7 +10209,7 @@
               </a:ln>
               <a:extLst>
                 <a:ext uri="{91240B29-F687-4f45-9708-019B960494DF}">
-                  <a14:hiddenLine xmlns:a14="http://schemas.microsoft.com/office/drawing/2010/main" xmlns="" w="9525">
+                  <a14:hiddenLine xmlns="" xmlns:a14="http://schemas.microsoft.com/office/drawing/2010/main" w="9525">
                     <a:solidFill>
                       <a:srgbClr val="000000"/>
                     </a:solidFill>
@@ -9865,7 +10319,7 @@
               </a:ln>
               <a:extLst>
                 <a:ext uri="{91240B29-F687-4f45-9708-019B960494DF}">
-                  <a14:hiddenLine xmlns:a14="http://schemas.microsoft.com/office/drawing/2010/main" xmlns="" w="9525">
+                  <a14:hiddenLine xmlns="" xmlns:a14="http://schemas.microsoft.com/office/drawing/2010/main" w="9525">
                     <a:solidFill>
                       <a:srgbClr val="000000"/>
                     </a:solidFill>
@@ -9949,7 +10403,7 @@
               </a:ln>
               <a:extLst>
                 <a:ext uri="{91240B29-F687-4f45-9708-019B960494DF}">
-                  <a14:hiddenLine xmlns:a14="http://schemas.microsoft.com/office/drawing/2010/main" xmlns="" w="9525">
+                  <a14:hiddenLine xmlns="" xmlns:a14="http://schemas.microsoft.com/office/drawing/2010/main" w="9525">
                     <a:solidFill>
                       <a:srgbClr val="000000"/>
                     </a:solidFill>
@@ -10011,7 +10465,7 @@
               </a:ln>
               <a:extLst>
                 <a:ext uri="{91240B29-F687-4f45-9708-019B960494DF}">
-                  <a14:hiddenLine xmlns:a14="http://schemas.microsoft.com/office/drawing/2010/main" xmlns="" w="9525">
+                  <a14:hiddenLine xmlns="" xmlns:a14="http://schemas.microsoft.com/office/drawing/2010/main" w="9525">
                     <a:solidFill>
                       <a:srgbClr val="000000"/>
                     </a:solidFill>
@@ -10073,7 +10527,7 @@
               </a:ln>
               <a:extLst>
                 <a:ext uri="{91240B29-F687-4f45-9708-019B960494DF}">
-                  <a14:hiddenLine xmlns:a14="http://schemas.microsoft.com/office/drawing/2010/main" xmlns="" w="9525">
+                  <a14:hiddenLine xmlns="" xmlns:a14="http://schemas.microsoft.com/office/drawing/2010/main" w="9525">
                     <a:solidFill>
                       <a:srgbClr val="000000"/>
                     </a:solidFill>
@@ -10163,7 +10617,7 @@
               </a:ln>
               <a:extLst>
                 <a:ext uri="{91240B29-F687-4f45-9708-019B960494DF}">
-                  <a14:hiddenLine xmlns:a14="http://schemas.microsoft.com/office/drawing/2010/main" xmlns="" w="9525">
+                  <a14:hiddenLine xmlns="" xmlns:a14="http://schemas.microsoft.com/office/drawing/2010/main" w="9525">
                     <a:solidFill>
                       <a:srgbClr val="000000"/>
                     </a:solidFill>
@@ -10197,7 +10651,7 @@
               </a:ln>
               <a:extLst>
                 <a:ext uri="{91240B29-F687-4f45-9708-019B960494DF}">
-                  <a14:hiddenLine xmlns:a14="http://schemas.microsoft.com/office/drawing/2010/main" xmlns="" w="9525">
+                  <a14:hiddenLine xmlns="" xmlns:a14="http://schemas.microsoft.com/office/drawing/2010/main" w="9525">
                     <a:solidFill>
                       <a:srgbClr val="000000"/>
                     </a:solidFill>
@@ -10262,7 +10716,7 @@
               </a:ln>
               <a:extLst>
                 <a:ext uri="{91240B29-F687-4f45-9708-019B960494DF}">
-                  <a14:hiddenLine xmlns:a14="http://schemas.microsoft.com/office/drawing/2010/main" xmlns="" w="9525">
+                  <a14:hiddenLine xmlns="" xmlns:a14="http://schemas.microsoft.com/office/drawing/2010/main" w="9525">
                     <a:solidFill>
                       <a:srgbClr val="000000"/>
                     </a:solidFill>
@@ -10352,7 +10806,7 @@
               </a:ln>
               <a:extLst>
                 <a:ext uri="{91240B29-F687-4f45-9708-019B960494DF}">
-                  <a14:hiddenLine xmlns:a14="http://schemas.microsoft.com/office/drawing/2010/main" xmlns="" w="9525">
+                  <a14:hiddenLine xmlns="" xmlns:a14="http://schemas.microsoft.com/office/drawing/2010/main" w="9525">
                     <a:solidFill>
                       <a:srgbClr val="000000"/>
                     </a:solidFill>
@@ -10414,7 +10868,7 @@
               </a:ln>
               <a:extLst>
                 <a:ext uri="{91240B29-F687-4f45-9708-019B960494DF}">
-                  <a14:hiddenLine xmlns:a14="http://schemas.microsoft.com/office/drawing/2010/main" xmlns="" w="9525">
+                  <a14:hiddenLine xmlns="" xmlns:a14="http://schemas.microsoft.com/office/drawing/2010/main" w="9525">
                     <a:solidFill>
                       <a:srgbClr val="000000"/>
                     </a:solidFill>
@@ -10504,7 +10958,7 @@
               </a:ln>
               <a:extLst>
                 <a:ext uri="{91240B29-F687-4f45-9708-019B960494DF}">
-                  <a14:hiddenLine xmlns:a14="http://schemas.microsoft.com/office/drawing/2010/main" xmlns="" w="9525">
+                  <a14:hiddenLine xmlns="" xmlns:a14="http://schemas.microsoft.com/office/drawing/2010/main" w="9525">
                     <a:solidFill>
                       <a:srgbClr val="000000"/>
                     </a:solidFill>
@@ -10569,7 +11023,7 @@
               </a:ln>
               <a:extLst>
                 <a:ext uri="{91240B29-F687-4f45-9708-019B960494DF}">
-                  <a14:hiddenLine xmlns:a14="http://schemas.microsoft.com/office/drawing/2010/main" xmlns="" w="9525">
+                  <a14:hiddenLine xmlns="" xmlns:a14="http://schemas.microsoft.com/office/drawing/2010/main" w="9525">
                     <a:solidFill>
                       <a:srgbClr val="000000"/>
                     </a:solidFill>
@@ -10631,7 +11085,7 @@
               </a:ln>
               <a:extLst>
                 <a:ext uri="{91240B29-F687-4f45-9708-019B960494DF}">
-                  <a14:hiddenLine xmlns:a14="http://schemas.microsoft.com/office/drawing/2010/main" xmlns="" w="9525">
+                  <a14:hiddenLine xmlns="" xmlns:a14="http://schemas.microsoft.com/office/drawing/2010/main" w="9525">
                     <a:solidFill>
                       <a:srgbClr val="000000"/>
                     </a:solidFill>
@@ -10721,7 +11175,7 @@
               </a:ln>
               <a:extLst>
                 <a:ext uri="{91240B29-F687-4f45-9708-019B960494DF}">
-                  <a14:hiddenLine xmlns:a14="http://schemas.microsoft.com/office/drawing/2010/main" xmlns="" w="9525">
+                  <a14:hiddenLine xmlns="" xmlns:a14="http://schemas.microsoft.com/office/drawing/2010/main" w="9525">
                     <a:solidFill>
                       <a:srgbClr val="000000"/>
                     </a:solidFill>
@@ -10811,7 +11265,7 @@
               </a:ln>
               <a:extLst>
                 <a:ext uri="{91240B29-F687-4f45-9708-019B960494DF}">
-                  <a14:hiddenLine xmlns:a14="http://schemas.microsoft.com/office/drawing/2010/main" xmlns="" w="9525">
+                  <a14:hiddenLine xmlns="" xmlns:a14="http://schemas.microsoft.com/office/drawing/2010/main" w="9525">
                     <a:solidFill>
                       <a:srgbClr val="000000"/>
                     </a:solidFill>
@@ -10876,7 +11330,7 @@
               </a:ln>
               <a:extLst>
                 <a:ext uri="{91240B29-F687-4f45-9708-019B960494DF}">
-                  <a14:hiddenLine xmlns:a14="http://schemas.microsoft.com/office/drawing/2010/main" xmlns="" w="9525">
+                  <a14:hiddenLine xmlns="" xmlns:a14="http://schemas.microsoft.com/office/drawing/2010/main" w="9525">
                     <a:solidFill>
                       <a:srgbClr val="000000"/>
                     </a:solidFill>
@@ -10996,7 +11450,7 @@
               </a:ln>
               <a:extLst>
                 <a:ext uri="{91240B29-F687-4f45-9708-019B960494DF}">
-                  <a14:hiddenLine xmlns:a14="http://schemas.microsoft.com/office/drawing/2010/main" xmlns="" w="9525">
+                  <a14:hiddenLine xmlns="" xmlns:a14="http://schemas.microsoft.com/office/drawing/2010/main" w="9525">
                     <a:solidFill>
                       <a:srgbClr val="000000"/>
                     </a:solidFill>
@@ -11077,7 +11531,7 @@
               </a:ln>
               <a:extLst>
                 <a:ext uri="{91240B29-F687-4f45-9708-019B960494DF}">
-                  <a14:hiddenLine xmlns:a14="http://schemas.microsoft.com/office/drawing/2010/main" xmlns="" w="9525">
+                  <a14:hiddenLine xmlns="" xmlns:a14="http://schemas.microsoft.com/office/drawing/2010/main" w="9525">
                     <a:solidFill>
                       <a:srgbClr val="000000"/>
                     </a:solidFill>
@@ -11192,7 +11646,7 @@
               </a:ln>
               <a:extLst>
                 <a:ext uri="{91240B29-F687-4f45-9708-019B960494DF}">
-                  <a14:hiddenLine xmlns:a14="http://schemas.microsoft.com/office/drawing/2010/main" xmlns="" w="9525">
+                  <a14:hiddenLine xmlns="" xmlns:a14="http://schemas.microsoft.com/office/drawing/2010/main" w="9525">
                     <a:solidFill>
                       <a:srgbClr val="000000"/>
                     </a:solidFill>
@@ -11282,7 +11736,7 @@
               </a:ln>
               <a:extLst>
                 <a:ext uri="{91240B29-F687-4f45-9708-019B960494DF}">
-                  <a14:hiddenLine xmlns:a14="http://schemas.microsoft.com/office/drawing/2010/main" xmlns="" w="9525">
+                  <a14:hiddenLine xmlns="" xmlns:a14="http://schemas.microsoft.com/office/drawing/2010/main" w="9525">
                     <a:solidFill>
                       <a:srgbClr val="000000"/>
                     </a:solidFill>
@@ -11347,7 +11801,7 @@
               </a:ln>
               <a:extLst>
                 <a:ext uri="{91240B29-F687-4f45-9708-019B960494DF}">
-                  <a14:hiddenLine xmlns:a14="http://schemas.microsoft.com/office/drawing/2010/main" xmlns="" w="9525">
+                  <a14:hiddenLine xmlns="" xmlns:a14="http://schemas.microsoft.com/office/drawing/2010/main" w="9525">
                     <a:solidFill>
                       <a:srgbClr val="000000"/>
                     </a:solidFill>
@@ -11437,7 +11891,7 @@
               </a:ln>
               <a:extLst>
                 <a:ext uri="{91240B29-F687-4f45-9708-019B960494DF}">
-                  <a14:hiddenLine xmlns:a14="http://schemas.microsoft.com/office/drawing/2010/main" xmlns="" w="9525">
+                  <a14:hiddenLine xmlns="" xmlns:a14="http://schemas.microsoft.com/office/drawing/2010/main" w="9525">
                     <a:solidFill>
                       <a:srgbClr val="000000"/>
                     </a:solidFill>
@@ -11505,7 +11959,7 @@
               </a:ln>
               <a:extLst>
                 <a:ext uri="{91240B29-F687-4f45-9708-019B960494DF}">
-                  <a14:hiddenLine xmlns:a14="http://schemas.microsoft.com/office/drawing/2010/main" xmlns="" w="9525">
+                  <a14:hiddenLine xmlns="" xmlns:a14="http://schemas.microsoft.com/office/drawing/2010/main" w="9525">
                     <a:solidFill>
                       <a:srgbClr val="000000"/>
                     </a:solidFill>
@@ -11595,7 +12049,7 @@
               </a:ln>
               <a:extLst>
                 <a:ext uri="{91240B29-F687-4f45-9708-019B960494DF}">
-                  <a14:hiddenLine xmlns:a14="http://schemas.microsoft.com/office/drawing/2010/main" xmlns="" w="9525">
+                  <a14:hiddenLine xmlns="" xmlns:a14="http://schemas.microsoft.com/office/drawing/2010/main" w="9525">
                     <a:solidFill>
                       <a:srgbClr val="000000"/>
                     </a:solidFill>
@@ -11663,7 +12117,7 @@
               </a:ln>
               <a:extLst>
                 <a:ext uri="{91240B29-F687-4f45-9708-019B960494DF}">
-                  <a14:hiddenLine xmlns:a14="http://schemas.microsoft.com/office/drawing/2010/main" xmlns="" w="9525">
+                  <a14:hiddenLine xmlns="" xmlns:a14="http://schemas.microsoft.com/office/drawing/2010/main" w="9525">
                     <a:solidFill>
                       <a:srgbClr val="000000"/>
                     </a:solidFill>
@@ -11753,7 +12207,7 @@
               </a:ln>
               <a:extLst>
                 <a:ext uri="{91240B29-F687-4f45-9708-019B960494DF}">
-                  <a14:hiddenLine xmlns:a14="http://schemas.microsoft.com/office/drawing/2010/main" xmlns="" w="9525">
+                  <a14:hiddenLine xmlns="" xmlns:a14="http://schemas.microsoft.com/office/drawing/2010/main" w="9525">
                     <a:solidFill>
                       <a:srgbClr val="000000"/>
                     </a:solidFill>
@@ -11787,7 +12241,7 @@
               </a:ln>
               <a:extLst>
                 <a:ext uri="{91240B29-F687-4f45-9708-019B960494DF}">
-                  <a14:hiddenLine xmlns:a14="http://schemas.microsoft.com/office/drawing/2010/main" xmlns="" w="9525">
+                  <a14:hiddenLine xmlns="" xmlns:a14="http://schemas.microsoft.com/office/drawing/2010/main" w="9525">
                     <a:solidFill>
                       <a:srgbClr val="000000"/>
                     </a:solidFill>
@@ -11928,7 +12382,7 @@
             <a:fld id="{48A87A34-81AB-432B-8DAE-1953F412C126}" type="datetimeFigureOut">
               <a:rPr lang="en-US" dirty="0"/>
               <a:pPr/>
-              <a:t>3/9/2020</a:t>
+              <a:t>3/10/2020</a:t>
             </a:fld>
             <a:endParaRPr lang="en-US" dirty="0"/>
           </a:p>
@@ -12406,8 +12860,8 @@
           <a:lstStyle/>
           <a:p>
             <a:r>
-              <a:rPr lang="en-US" dirty="0" err="1" smtClean="0"/>
-              <a:t>Ecosave</a:t>
+              <a:rPr lang="en-US" dirty="0" smtClean="0"/>
+              <a:t>Go-Recycler</a:t>
             </a:r>
             <a:endParaRPr lang="en-US" dirty="0"/>
           </a:p>
@@ -12637,7 +13091,7 @@
           <p:nvPr/>
         </p:nvPicPr>
         <p:blipFill>
-          <a:blip r:embed="rId2">
+          <a:blip r:embed="rId3">
             <a:extLst>
               <a:ext uri="{28A0092B-C50C-407E-A947-70E740481C1C}">
                 <a14:useLocalDpi xmlns:a14="http://schemas.microsoft.com/office/drawing/2010/main" val="0"/>
@@ -12667,7 +13121,7 @@
           <p:nvPr/>
         </p:nvPicPr>
         <p:blipFill>
-          <a:blip r:embed="rId3">
+          <a:blip r:embed="rId4">
             <a:extLst>
               <a:ext uri="{28A0092B-C50C-407E-A947-70E740481C1C}">
                 <a14:useLocalDpi xmlns:a14="http://schemas.microsoft.com/office/drawing/2010/main" val="0"/>
@@ -12708,7 +13162,7 @@
           <p:nvPr/>
         </p:nvPicPr>
         <p:blipFill>
-          <a:blip r:embed="rId4">
+          <a:blip r:embed="rId5">
             <a:extLst>
               <a:ext uri="{28A0092B-C50C-407E-A947-70E740481C1C}">
                 <a14:useLocalDpi xmlns:a14="http://schemas.microsoft.com/office/drawing/2010/main" val="0"/>
@@ -12794,11 +13248,7 @@
           <a:p>
             <a:r>
               <a:rPr lang="en-US" dirty="0"/>
-              <a:t>Use case diagram - division of work for iteration 1</a:t>
-            </a:r>
-            <a:r>
-              <a:rPr lang="en-US" dirty="0"/>
-              <a:t> </a:t>
+              <a:t>Use case diagram - division of work for iteration 1 </a:t>
             </a:r>
           </a:p>
         </p:txBody>
@@ -13044,11 +13494,7 @@
             <a:pPr algn="ctr"/>
             <a:r>
               <a:rPr lang="en-US" dirty="0"/>
-              <a:t>Demo of Prototype</a:t>
-            </a:r>
-            <a:r>
-              <a:rPr lang="en-US" dirty="0"/>
-              <a:t> </a:t>
+              <a:t>Demo of Prototype </a:t>
             </a:r>
           </a:p>
         </p:txBody>
@@ -13335,11 +13781,7 @@
           <a:p>
             <a:r>
               <a:rPr lang="en-US" dirty="0"/>
-              <a:t>Updated Gantt Chart</a:t>
-            </a:r>
-            <a:r>
-              <a:rPr lang="en-US" dirty="0"/>
-              <a:t> </a:t>
+              <a:t>Updated Gantt Chart </a:t>
             </a:r>
           </a:p>
         </p:txBody>
@@ -13703,4 +14145,265 @@
     </a:ext>
   </a:extLst>
 </a:theme>
+</file>
+
+<file path=ppt/theme/theme2.xml><?xml version="1.0" encoding="utf-8"?>
+<a:theme xmlns:a="http://schemas.openxmlformats.org/drawingml/2006/main" name="Office Theme">
+  <a:themeElements>
+    <a:clrScheme name="Office">
+      <a:dk1>
+        <a:sysClr val="windowText" lastClr="000000"/>
+      </a:dk1>
+      <a:lt1>
+        <a:sysClr val="window" lastClr="FFFFFF"/>
+      </a:lt1>
+      <a:dk2>
+        <a:srgbClr val="44546A"/>
+      </a:dk2>
+      <a:lt2>
+        <a:srgbClr val="E7E6E6"/>
+      </a:lt2>
+      <a:accent1>
+        <a:srgbClr val="5B9BD5"/>
+      </a:accent1>
+      <a:accent2>
+        <a:srgbClr val="ED7D31"/>
+      </a:accent2>
+      <a:accent3>
+        <a:srgbClr val="A5A5A5"/>
+      </a:accent3>
+      <a:accent4>
+        <a:srgbClr val="FFC000"/>
+      </a:accent4>
+      <a:accent5>
+        <a:srgbClr val="4472C4"/>
+      </a:accent5>
+      <a:accent6>
+        <a:srgbClr val="70AD47"/>
+      </a:accent6>
+      <a:hlink>
+        <a:srgbClr val="0563C1"/>
+      </a:hlink>
+      <a:folHlink>
+        <a:srgbClr val="954F72"/>
+      </a:folHlink>
+    </a:clrScheme>
+    <a:fontScheme name="Office">
+      <a:majorFont>
+        <a:latin typeface="Calibri Light" panose="020F0302020204030204"/>
+        <a:ea typeface=""/>
+        <a:cs typeface=""/>
+        <a:font script="Jpan" typeface="游ゴシック Light"/>
+        <a:font script="Hang" typeface="맑은 고딕"/>
+        <a:font script="Hans" typeface="等线 Light"/>
+        <a:font script="Hant" typeface="新細明體"/>
+        <a:font script="Arab" typeface="Times New Roman"/>
+        <a:font script="Hebr" typeface="Times New Roman"/>
+        <a:font script="Thai" typeface="Angsana New"/>
+        <a:font script="Ethi" typeface="Nyala"/>
+        <a:font script="Beng" typeface="Vrinda"/>
+        <a:font script="Gujr" typeface="Shruti"/>
+        <a:font script="Khmr" typeface="MoolBoran"/>
+        <a:font script="Knda" typeface="Tunga"/>
+        <a:font script="Guru" typeface="Raavi"/>
+        <a:font script="Cans" typeface="Euphemia"/>
+        <a:font script="Cher" typeface="Plantagenet Cherokee"/>
+        <a:font script="Yiii" typeface="Microsoft Yi Baiti"/>
+        <a:font script="Tibt" typeface="Microsoft Himalaya"/>
+        <a:font script="Thaa" typeface="MV Boli"/>
+        <a:font script="Deva" typeface="Mangal"/>
+        <a:font script="Telu" typeface="Gautami"/>
+        <a:font script="Taml" typeface="Latha"/>
+        <a:font script="Syrc" typeface="Estrangelo Edessa"/>
+        <a:font script="Orya" typeface="Kalinga"/>
+        <a:font script="Mlym" typeface="Kartika"/>
+        <a:font script="Laoo" typeface="DokChampa"/>
+        <a:font script="Sinh" typeface="Iskoola Pota"/>
+        <a:font script="Mong" typeface="Mongolian Baiti"/>
+        <a:font script="Viet" typeface="Times New Roman"/>
+        <a:font script="Uigh" typeface="Microsoft Uighur"/>
+        <a:font script="Geor" typeface="Sylfaen"/>
+      </a:majorFont>
+      <a:minorFont>
+        <a:latin typeface="Calibri" panose="020F0502020204030204"/>
+        <a:ea typeface=""/>
+        <a:cs typeface=""/>
+        <a:font script="Jpan" typeface="游ゴシック"/>
+        <a:font script="Hang" typeface="맑은 고딕"/>
+        <a:font script="Hans" typeface="等线"/>
+        <a:font script="Hant" typeface="新細明體"/>
+        <a:font script="Arab" typeface="Arial"/>
+        <a:font script="Hebr" typeface="Arial"/>
+        <a:font script="Thai" typeface="Cordia New"/>
+        <a:font script="Ethi" typeface="Nyala"/>
+        <a:font script="Beng" typeface="Vrinda"/>
+        <a:font script="Gujr" typeface="Shruti"/>
+        <a:font script="Khmr" typeface="DaunPenh"/>
+        <a:font script="Knda" typeface="Tunga"/>
+        <a:font script="Guru" typeface="Raavi"/>
+        <a:font script="Cans" typeface="Euphemia"/>
+        <a:font script="Cher" typeface="Plantagenet Cherokee"/>
+        <a:font script="Yiii" typeface="Microsoft Yi Baiti"/>
+        <a:font script="Tibt" typeface="Microsoft Himalaya"/>
+        <a:font script="Thaa" typeface="MV Boli"/>
+        <a:font script="Deva" typeface="Mangal"/>
+        <a:font script="Telu" typeface="Gautami"/>
+        <a:font script="Taml" typeface="Latha"/>
+        <a:font script="Syrc" typeface="Estrangelo Edessa"/>
+        <a:font script="Orya" typeface="Kalinga"/>
+        <a:font script="Mlym" typeface="Kartika"/>
+        <a:font script="Laoo" typeface="DokChampa"/>
+        <a:font script="Sinh" typeface="Iskoola Pota"/>
+        <a:font script="Mong" typeface="Mongolian Baiti"/>
+        <a:font script="Viet" typeface="Arial"/>
+        <a:font script="Uigh" typeface="Microsoft Uighur"/>
+        <a:font script="Geor" typeface="Sylfaen"/>
+      </a:minorFont>
+    </a:fontScheme>
+    <a:fmtScheme name="Office">
+      <a:fillStyleLst>
+        <a:solidFill>
+          <a:schemeClr val="phClr"/>
+        </a:solidFill>
+        <a:gradFill rotWithShape="1">
+          <a:gsLst>
+            <a:gs pos="0">
+              <a:schemeClr val="phClr">
+                <a:lumMod val="110000"/>
+                <a:satMod val="105000"/>
+                <a:tint val="67000"/>
+              </a:schemeClr>
+            </a:gs>
+            <a:gs pos="50000">
+              <a:schemeClr val="phClr">
+                <a:lumMod val="105000"/>
+                <a:satMod val="103000"/>
+                <a:tint val="73000"/>
+              </a:schemeClr>
+            </a:gs>
+            <a:gs pos="100000">
+              <a:schemeClr val="phClr">
+                <a:lumMod val="105000"/>
+                <a:satMod val="109000"/>
+                <a:tint val="81000"/>
+              </a:schemeClr>
+            </a:gs>
+          </a:gsLst>
+          <a:lin ang="5400000" scaled="0"/>
+        </a:gradFill>
+        <a:gradFill rotWithShape="1">
+          <a:gsLst>
+            <a:gs pos="0">
+              <a:schemeClr val="phClr">
+                <a:satMod val="103000"/>
+                <a:lumMod val="102000"/>
+                <a:tint val="94000"/>
+              </a:schemeClr>
+            </a:gs>
+            <a:gs pos="50000">
+              <a:schemeClr val="phClr">
+                <a:satMod val="110000"/>
+                <a:lumMod val="100000"/>
+                <a:shade val="100000"/>
+              </a:schemeClr>
+            </a:gs>
+            <a:gs pos="100000">
+              <a:schemeClr val="phClr">
+                <a:lumMod val="99000"/>
+                <a:satMod val="120000"/>
+                <a:shade val="78000"/>
+              </a:schemeClr>
+            </a:gs>
+          </a:gsLst>
+          <a:lin ang="5400000" scaled="0"/>
+        </a:gradFill>
+      </a:fillStyleLst>
+      <a:lnStyleLst>
+        <a:ln w="6350" cap="flat" cmpd="sng" algn="ctr">
+          <a:solidFill>
+            <a:schemeClr val="phClr"/>
+          </a:solidFill>
+          <a:prstDash val="solid"/>
+          <a:miter lim="800000"/>
+        </a:ln>
+        <a:ln w="12700" cap="flat" cmpd="sng" algn="ctr">
+          <a:solidFill>
+            <a:schemeClr val="phClr"/>
+          </a:solidFill>
+          <a:prstDash val="solid"/>
+          <a:miter lim="800000"/>
+        </a:ln>
+        <a:ln w="19050" cap="flat" cmpd="sng" algn="ctr">
+          <a:solidFill>
+            <a:schemeClr val="phClr"/>
+          </a:solidFill>
+          <a:prstDash val="solid"/>
+          <a:miter lim="800000"/>
+        </a:ln>
+      </a:lnStyleLst>
+      <a:effectStyleLst>
+        <a:effectStyle>
+          <a:effectLst/>
+        </a:effectStyle>
+        <a:effectStyle>
+          <a:effectLst/>
+        </a:effectStyle>
+        <a:effectStyle>
+          <a:effectLst>
+            <a:outerShdw blurRad="57150" dist="19050" dir="5400000" algn="ctr" rotWithShape="0">
+              <a:srgbClr val="000000">
+                <a:alpha val="63000"/>
+              </a:srgbClr>
+            </a:outerShdw>
+          </a:effectLst>
+        </a:effectStyle>
+      </a:effectStyleLst>
+      <a:bgFillStyleLst>
+        <a:solidFill>
+          <a:schemeClr val="phClr"/>
+        </a:solidFill>
+        <a:solidFill>
+          <a:schemeClr val="phClr">
+            <a:tint val="95000"/>
+            <a:satMod val="170000"/>
+          </a:schemeClr>
+        </a:solidFill>
+        <a:gradFill rotWithShape="1">
+          <a:gsLst>
+            <a:gs pos="0">
+              <a:schemeClr val="phClr">
+                <a:tint val="93000"/>
+                <a:satMod val="150000"/>
+                <a:shade val="98000"/>
+                <a:lumMod val="102000"/>
+              </a:schemeClr>
+            </a:gs>
+            <a:gs pos="50000">
+              <a:schemeClr val="phClr">
+                <a:tint val="98000"/>
+                <a:satMod val="130000"/>
+                <a:shade val="90000"/>
+                <a:lumMod val="103000"/>
+              </a:schemeClr>
+            </a:gs>
+            <a:gs pos="100000">
+              <a:schemeClr val="phClr">
+                <a:shade val="63000"/>
+                <a:satMod val="120000"/>
+              </a:schemeClr>
+            </a:gs>
+          </a:gsLst>
+          <a:lin ang="5400000" scaled="0"/>
+        </a:gradFill>
+      </a:bgFillStyleLst>
+    </a:fmtScheme>
+  </a:themeElements>
+  <a:objectDefaults/>
+  <a:extraClrSchemeLst/>
+  <a:extLst>
+    <a:ext uri="{05A4C25C-085E-4340-85A3-A5531E510DB2}">
+      <thm15:themeFamily xmlns:thm15="http://schemas.microsoft.com/office/thememl/2012/main" name="Office Theme" id="{62F939B6-93AF-4DB8-9C6B-D6C7DFDC589F}" vid="{4A3C46E8-61CC-4603-A589-7422A47A8E4A}"/>
+    </a:ext>
+  </a:extLst>
+</a:theme>
 </file>
</xml_diff>